<commit_message>
adding changes to chapter 2
</commit_message>
<xml_diff>
--- a/topic1_Bias-variance trade-off/Ch2.pptx
+++ b/topic1_Bias-variance trade-off/Ch2.pptx
@@ -234,7 +234,7 @@
           <a:p>
             <a:fld id="{C91A8DEF-6B4C-344C-A1D7-289EEC596837}" type="datetimeFigureOut">
               <a:rPr lang="en-US" smtClean="0"/>
-              <a:t>8/25/2023</a:t>
+              <a:t>8/29/2023</a:t>
             </a:fld>
             <a:endParaRPr lang="en-US"/>
           </a:p>
@@ -1291,7 +1291,7 @@
           <a:p>
             <a:fld id="{FE3B6A38-413F-BE40-BB70-85B88EE96E1B}" type="datetimeFigureOut">
               <a:rPr lang="en-US" smtClean="0"/>
-              <a:t>8/25/2023</a:t>
+              <a:t>8/29/2023</a:t>
             </a:fld>
             <a:endParaRPr lang="en-US"/>
           </a:p>
@@ -1489,7 +1489,7 @@
           <a:p>
             <a:fld id="{FE3B6A38-413F-BE40-BB70-85B88EE96E1B}" type="datetimeFigureOut">
               <a:rPr lang="en-US" smtClean="0"/>
-              <a:t>8/25/2023</a:t>
+              <a:t>8/29/2023</a:t>
             </a:fld>
             <a:endParaRPr lang="en-US"/>
           </a:p>
@@ -1697,7 +1697,7 @@
           <a:p>
             <a:fld id="{FE3B6A38-413F-BE40-BB70-85B88EE96E1B}" type="datetimeFigureOut">
               <a:rPr lang="en-US" smtClean="0"/>
-              <a:t>8/25/2023</a:t>
+              <a:t>8/29/2023</a:t>
             </a:fld>
             <a:endParaRPr lang="en-US"/>
           </a:p>
@@ -1895,7 +1895,7 @@
           <a:p>
             <a:fld id="{FE3B6A38-413F-BE40-BB70-85B88EE96E1B}" type="datetimeFigureOut">
               <a:rPr lang="en-US" smtClean="0"/>
-              <a:t>8/25/2023</a:t>
+              <a:t>8/29/2023</a:t>
             </a:fld>
             <a:endParaRPr lang="en-US"/>
           </a:p>
@@ -2170,7 +2170,7 @@
           <a:p>
             <a:fld id="{FE3B6A38-413F-BE40-BB70-85B88EE96E1B}" type="datetimeFigureOut">
               <a:rPr lang="en-US" smtClean="0"/>
-              <a:t>8/25/2023</a:t>
+              <a:t>8/29/2023</a:t>
             </a:fld>
             <a:endParaRPr lang="en-US"/>
           </a:p>
@@ -2435,7 +2435,7 @@
           <a:p>
             <a:fld id="{FE3B6A38-413F-BE40-BB70-85B88EE96E1B}" type="datetimeFigureOut">
               <a:rPr lang="en-US" smtClean="0"/>
-              <a:t>8/25/2023</a:t>
+              <a:t>8/29/2023</a:t>
             </a:fld>
             <a:endParaRPr lang="en-US"/>
           </a:p>
@@ -2847,7 +2847,7 @@
           <a:p>
             <a:fld id="{FE3B6A38-413F-BE40-BB70-85B88EE96E1B}" type="datetimeFigureOut">
               <a:rPr lang="en-US" smtClean="0"/>
-              <a:t>8/25/2023</a:t>
+              <a:t>8/29/2023</a:t>
             </a:fld>
             <a:endParaRPr lang="en-US"/>
           </a:p>
@@ -2988,7 +2988,7 @@
           <a:p>
             <a:fld id="{FE3B6A38-413F-BE40-BB70-85B88EE96E1B}" type="datetimeFigureOut">
               <a:rPr lang="en-US" smtClean="0"/>
-              <a:t>8/25/2023</a:t>
+              <a:t>8/29/2023</a:t>
             </a:fld>
             <a:endParaRPr lang="en-US"/>
           </a:p>
@@ -3101,7 +3101,7 @@
           <a:p>
             <a:fld id="{FE3B6A38-413F-BE40-BB70-85B88EE96E1B}" type="datetimeFigureOut">
               <a:rPr lang="en-US" smtClean="0"/>
-              <a:t>8/25/2023</a:t>
+              <a:t>8/29/2023</a:t>
             </a:fld>
             <a:endParaRPr lang="en-US"/>
           </a:p>
@@ -3412,7 +3412,7 @@
           <a:p>
             <a:fld id="{FE3B6A38-413F-BE40-BB70-85B88EE96E1B}" type="datetimeFigureOut">
               <a:rPr lang="en-US" smtClean="0"/>
-              <a:t>8/25/2023</a:t>
+              <a:t>8/29/2023</a:t>
             </a:fld>
             <a:endParaRPr lang="en-US"/>
           </a:p>
@@ -3700,7 +3700,7 @@
           <a:p>
             <a:fld id="{FE3B6A38-413F-BE40-BB70-85B88EE96E1B}" type="datetimeFigureOut">
               <a:rPr lang="en-US" smtClean="0"/>
-              <a:t>8/25/2023</a:t>
+              <a:t>8/29/2023</a:t>
             </a:fld>
             <a:endParaRPr lang="en-US"/>
           </a:p>
@@ -3941,7 +3941,7 @@
           <a:p>
             <a:fld id="{FE3B6A38-413F-BE40-BB70-85B88EE96E1B}" type="datetimeFigureOut">
               <a:rPr lang="en-US" smtClean="0"/>
-              <a:t>8/25/2023</a:t>
+              <a:t>8/29/2023</a:t>
             </a:fld>
             <a:endParaRPr lang="en-US"/>
           </a:p>
@@ -5951,8 +5951,8 @@
           </a:p>
         </p:txBody>
       </p:sp>
-      <mc:AlternateContent xmlns:mc="http://schemas.openxmlformats.org/markup-compatibility/2006">
-        <mc:Choice xmlns:a14="http://schemas.microsoft.com/office/drawing/2010/main" Requires="a14">
+      <mc:AlternateContent xmlns:mc="http://schemas.openxmlformats.org/markup-compatibility/2006" xmlns:a14="http://schemas.microsoft.com/office/drawing/2010/main">
+        <mc:Choice Requires="a14">
           <p:sp>
             <p:nvSpPr>
               <p:cNvPr id="3" name="Content Placeholder 2">
@@ -6600,7 +6600,7 @@
             </p:txBody>
           </p:sp>
         </mc:Choice>
-        <mc:Fallback>
+        <mc:Fallback xmlns="">
           <p:sp>
             <p:nvSpPr>
               <p:cNvPr id="3" name="Content Placeholder 2">
@@ -11995,8 +11995,8 @@
           </a:p>
         </p:txBody>
       </p:sp>
-      <mc:AlternateContent xmlns:mc="http://schemas.openxmlformats.org/markup-compatibility/2006" xmlns:a14="http://schemas.microsoft.com/office/drawing/2010/main">
-        <mc:Choice Requires="a14">
+      <mc:AlternateContent xmlns:mc="http://schemas.openxmlformats.org/markup-compatibility/2006">
+        <mc:Choice xmlns:a14="http://schemas.microsoft.com/office/drawing/2010/main" Requires="a14">
           <p:sp>
             <p:nvSpPr>
               <p:cNvPr id="3" name="Content Placeholder 2">
@@ -12515,7 +12515,11 @@
                   <a:t> </a:t>
                 </a:r>
                 <a:r>
-                  <a:rPr lang="en-US" altLang="zh-CN" dirty="0"/>
+                  <a:rPr lang="en-US" altLang="zh-CN" dirty="0">
+                    <a:solidFill>
+                      <a:srgbClr val="FF0000"/>
+                    </a:solidFill>
+                  </a:rPr>
                   <a:t>assumption</a:t>
                 </a:r>
                 <a:r>
@@ -12619,7 +12623,7 @@
             </p:txBody>
           </p:sp>
         </mc:Choice>
-        <mc:Fallback xmlns="">
+        <mc:Fallback>
           <p:sp>
             <p:nvSpPr>
               <p:cNvPr id="3" name="Content Placeholder 2">
@@ -12640,7 +12644,7 @@
               <a:blipFill>
                 <a:blip r:embed="rId2"/>
                 <a:stretch>
-                  <a:fillRect l="-1206" t="-2326" r="-1206"/>
+                  <a:fillRect l="-1217" t="-2381"/>
                 </a:stretch>
               </a:blipFill>
             </p:spPr>

</xml_diff>